<commit_message>
added new figures and compared against the old ones
</commit_message>
<xml_diff>
--- a/remake_figures/post_processing_figs_normal.pptx
+++ b/remake_figures/post_processing_figs_normal.pptx
@@ -248,7 +248,7 @@
           <a:p>
             <a:fld id="{9EA75ECA-0918-3546-879C-2D9AD65E7906}" type="datetimeFigureOut">
               <a:rPr lang="en-US" smtClean="0"/>
-              <a:t>4/18/22</a:t>
+              <a:t>6/20/22</a:t>
             </a:fld>
             <a:endParaRPr lang="en-US"/>
           </a:p>
@@ -418,7 +418,7 @@
           <a:p>
             <a:fld id="{9EA75ECA-0918-3546-879C-2D9AD65E7906}" type="datetimeFigureOut">
               <a:rPr lang="en-US" smtClean="0"/>
-              <a:t>4/18/22</a:t>
+              <a:t>6/20/22</a:t>
             </a:fld>
             <a:endParaRPr lang="en-US"/>
           </a:p>
@@ -598,7 +598,7 @@
           <a:p>
             <a:fld id="{9EA75ECA-0918-3546-879C-2D9AD65E7906}" type="datetimeFigureOut">
               <a:rPr lang="en-US" smtClean="0"/>
-              <a:t>4/18/22</a:t>
+              <a:t>6/20/22</a:t>
             </a:fld>
             <a:endParaRPr lang="en-US"/>
           </a:p>
@@ -768,7 +768,7 @@
           <a:p>
             <a:fld id="{9EA75ECA-0918-3546-879C-2D9AD65E7906}" type="datetimeFigureOut">
               <a:rPr lang="en-US" smtClean="0"/>
-              <a:t>4/18/22</a:t>
+              <a:t>6/20/22</a:t>
             </a:fld>
             <a:endParaRPr lang="en-US"/>
           </a:p>
@@ -1012,7 +1012,7 @@
           <a:p>
             <a:fld id="{9EA75ECA-0918-3546-879C-2D9AD65E7906}" type="datetimeFigureOut">
               <a:rPr lang="en-US" smtClean="0"/>
-              <a:t>4/18/22</a:t>
+              <a:t>6/20/22</a:t>
             </a:fld>
             <a:endParaRPr lang="en-US"/>
           </a:p>
@@ -1244,7 +1244,7 @@
           <a:p>
             <a:fld id="{9EA75ECA-0918-3546-879C-2D9AD65E7906}" type="datetimeFigureOut">
               <a:rPr lang="en-US" smtClean="0"/>
-              <a:t>4/18/22</a:t>
+              <a:t>6/20/22</a:t>
             </a:fld>
             <a:endParaRPr lang="en-US"/>
           </a:p>
@@ -1611,7 +1611,7 @@
           <a:p>
             <a:fld id="{9EA75ECA-0918-3546-879C-2D9AD65E7906}" type="datetimeFigureOut">
               <a:rPr lang="en-US" smtClean="0"/>
-              <a:t>4/18/22</a:t>
+              <a:t>6/20/22</a:t>
             </a:fld>
             <a:endParaRPr lang="en-US"/>
           </a:p>
@@ -1729,7 +1729,7 @@
           <a:p>
             <a:fld id="{9EA75ECA-0918-3546-879C-2D9AD65E7906}" type="datetimeFigureOut">
               <a:rPr lang="en-US" smtClean="0"/>
-              <a:t>4/18/22</a:t>
+              <a:t>6/20/22</a:t>
             </a:fld>
             <a:endParaRPr lang="en-US"/>
           </a:p>
@@ -1824,7 +1824,7 @@
           <a:p>
             <a:fld id="{9EA75ECA-0918-3546-879C-2D9AD65E7906}" type="datetimeFigureOut">
               <a:rPr lang="en-US" smtClean="0"/>
-              <a:t>4/18/22</a:t>
+              <a:t>6/20/22</a:t>
             </a:fld>
             <a:endParaRPr lang="en-US"/>
           </a:p>
@@ -2101,7 +2101,7 @@
           <a:p>
             <a:fld id="{9EA75ECA-0918-3546-879C-2D9AD65E7906}" type="datetimeFigureOut">
               <a:rPr lang="en-US" smtClean="0"/>
-              <a:t>4/18/22</a:t>
+              <a:t>6/20/22</a:t>
             </a:fld>
             <a:endParaRPr lang="en-US"/>
           </a:p>
@@ -2358,7 +2358,7 @@
           <a:p>
             <a:fld id="{9EA75ECA-0918-3546-879C-2D9AD65E7906}" type="datetimeFigureOut">
               <a:rPr lang="en-US" smtClean="0"/>
-              <a:t>4/18/22</a:t>
+              <a:t>6/20/22</a:t>
             </a:fld>
             <a:endParaRPr lang="en-US"/>
           </a:p>
@@ -2571,7 +2571,7 @@
           <a:p>
             <a:fld id="{9EA75ECA-0918-3546-879C-2D9AD65E7906}" type="datetimeFigureOut">
               <a:rPr lang="en-US" smtClean="0"/>
-              <a:t>4/18/22</a:t>
+              <a:t>6/20/22</a:t>
             </a:fld>
             <a:endParaRPr lang="en-US"/>
           </a:p>
@@ -2960,7 +2960,7 @@
 </file>
 
 <file path=ppt/slides/slide1.xml><?xml version="1.0" encoding="utf-8"?>
-<p:sld xmlns:a="http://schemas.openxmlformats.org/drawingml/2006/main" xmlns:r="http://schemas.openxmlformats.org/officeDocument/2006/relationships" xmlns:p="http://schemas.openxmlformats.org/presentationml/2006/main" show="0">
+<p:sld xmlns:a="http://schemas.openxmlformats.org/drawingml/2006/main" xmlns:r="http://schemas.openxmlformats.org/officeDocument/2006/relationships" xmlns:p="http://schemas.openxmlformats.org/presentationml/2006/main">
   <p:cSld>
     <p:spTree>
       <p:nvGrpSpPr>
@@ -3055,7 +3055,7 @@
         </p:blipFill>
         <p:spPr>
           <a:xfrm>
-            <a:off x="6722852" y="4827470"/>
+            <a:off x="6722852" y="4628687"/>
             <a:ext cx="2345634" cy="886003"/>
           </a:xfrm>
           <a:prstGeom prst="rect">
@@ -3065,10 +3065,10 @@
       </p:pic>
       <p:pic>
         <p:nvPicPr>
-          <p:cNvPr id="31" name="Picture 30">
+          <p:cNvPr id="3" name="Picture 2">
             <a:extLst>
               <a:ext uri="{FF2B5EF4-FFF2-40B4-BE49-F238E27FC236}">
-                <a16:creationId xmlns:a16="http://schemas.microsoft.com/office/drawing/2014/main" id="{6CE7E9B5-6CB9-C5EF-6645-2FD4086C7C97}"/>
+                <a16:creationId xmlns:a16="http://schemas.microsoft.com/office/drawing/2014/main" id="{5936F526-EAFD-AA67-EF15-8AC06847C1C9}"/>
               </a:ext>
             </a:extLst>
           </p:cNvPr>
@@ -3077,15 +3077,16 @@
           </p:cNvPicPr>
           <p:nvPr/>
         </p:nvPicPr>
-        <p:blipFill rotWithShape="1">
+        <p:blipFill>
           <a:blip r:embed="rId5"/>
-          <a:srcRect t="7785"/>
-          <a:stretch/>
+          <a:stretch>
+            <a:fillRect/>
+          </a:stretch>
         </p:blipFill>
         <p:spPr>
           <a:xfrm>
-            <a:off x="99914" y="12991"/>
-            <a:ext cx="7431631" cy="6853103"/>
+            <a:off x="75514" y="-555431"/>
+            <a:ext cx="7413431" cy="7413431"/>
           </a:xfrm>
           <a:prstGeom prst="rect">
             <a:avLst/>
@@ -3106,7 +3107,7 @@
 </file>
 
 <file path=ppt/slides/slide2.xml><?xml version="1.0" encoding="utf-8"?>
-<p:sld xmlns:a="http://schemas.openxmlformats.org/drawingml/2006/main" xmlns:r="http://schemas.openxmlformats.org/officeDocument/2006/relationships" xmlns:p="http://schemas.openxmlformats.org/presentationml/2006/main">
+<p:sld xmlns:a="http://schemas.openxmlformats.org/drawingml/2006/main" xmlns:r="http://schemas.openxmlformats.org/officeDocument/2006/relationships" xmlns:p="http://schemas.openxmlformats.org/presentationml/2006/main" show="0">
   <p:cSld>
     <p:spTree>
       <p:nvGrpSpPr>
@@ -3617,7 +3618,7 @@
 </file>
 
 <file path=ppt/slides/slide6.xml><?xml version="1.0" encoding="utf-8"?>
-<p:sld xmlns:a="http://schemas.openxmlformats.org/drawingml/2006/main" xmlns:r="http://schemas.openxmlformats.org/officeDocument/2006/relationships" xmlns:p="http://schemas.openxmlformats.org/presentationml/2006/main">
+<p:sld xmlns:a="http://schemas.openxmlformats.org/drawingml/2006/main" xmlns:r="http://schemas.openxmlformats.org/officeDocument/2006/relationships" xmlns:p="http://schemas.openxmlformats.org/presentationml/2006/main" show="0">
   <p:cSld>
     <p:spTree>
       <p:nvGrpSpPr>

</xml_diff>